<commit_message>
fix Django 1.6 import issue
</commit_message>
<xml_diff>
--- a/Class10_django_templates/django_templates.pptx
+++ b/Class10_django_templates/django_templates.pptx
@@ -1128,6 +1128,13 @@
         </dgm:presLayoutVars>
       </dgm:prSet>
       <dgm:spPr/>
+      <dgm:t>
+        <a:bodyPr/>
+        <a:lstStyle/>
+        <a:p>
+          <a:endParaRPr lang="en-US"/>
+        </a:p>
+      </dgm:t>
     </dgm:pt>
     <dgm:pt modelId="{BC9485F2-D34C-D14D-A138-5FCDE21F80E9}" type="pres">
       <dgm:prSet presAssocID="{2E9AB500-9EEA-B24B-BFAD-23E9F6854E03}" presName="compNode" presStyleCnt="0"/>
@@ -1208,10 +1215,24 @@
     <dgm:pt modelId="{7CEBFC04-FE3E-7A40-B322-27A11792D2AE}" type="pres">
       <dgm:prSet presAssocID="{35879848-7C56-7B45-B696-578D096A64E5}" presName="aNode" presStyleLbl="bgShp" presStyleIdx="1" presStyleCnt="2"/>
       <dgm:spPr/>
+      <dgm:t>
+        <a:bodyPr/>
+        <a:lstStyle/>
+        <a:p>
+          <a:endParaRPr lang="en-US"/>
+        </a:p>
+      </dgm:t>
     </dgm:pt>
     <dgm:pt modelId="{64C70908-601D-C94D-8310-E27E40AB0A4B}" type="pres">
       <dgm:prSet presAssocID="{35879848-7C56-7B45-B696-578D096A64E5}" presName="textNode" presStyleLbl="bgShp" presStyleIdx="1" presStyleCnt="2"/>
       <dgm:spPr/>
+      <dgm:t>
+        <a:bodyPr/>
+        <a:lstStyle/>
+        <a:p>
+          <a:endParaRPr lang="en-US"/>
+        </a:p>
+      </dgm:t>
     </dgm:pt>
     <dgm:pt modelId="{AC026E0C-2B12-914D-BF87-3B699D6EE92E}" type="pres">
       <dgm:prSet presAssocID="{35879848-7C56-7B45-B696-578D096A64E5}" presName="compChildNode" presStyleCnt="0"/>
@@ -1228,6 +1249,13 @@
         </dgm:presLayoutVars>
       </dgm:prSet>
       <dgm:spPr/>
+      <dgm:t>
+        <a:bodyPr/>
+        <a:lstStyle/>
+        <a:p>
+          <a:endParaRPr lang="en-US"/>
+        </a:p>
+      </dgm:t>
     </dgm:pt>
     <dgm:pt modelId="{260D72A1-BCBC-374A-9D8F-763D0C8BFA43}" type="pres">
       <dgm:prSet presAssocID="{E59406EE-94DA-BE4C-97E2-AFF954C4C6B7}" presName="aSpace2" presStyleCnt="0"/>
@@ -1250,21 +1278,21 @@
     </dgm:pt>
   </dgm:ptLst>
   <dgm:cxnLst>
+    <dgm:cxn modelId="{E2C5E512-5507-D844-8420-B386D677ACDD}" srcId="{35879848-7C56-7B45-B696-578D096A64E5}" destId="{70780454-15F8-6C4A-8BE4-3F4846B33989}" srcOrd="1" destOrd="0" parTransId="{ADC686A8-A33B-1D45-AF57-EF5889F1803F}" sibTransId="{3C958075-157F-FE40-AACC-4CDAD7400F7A}"/>
+    <dgm:cxn modelId="{29570A30-B24A-104A-90FC-871E1B1AE76D}" srcId="{2E9AB500-9EEA-B24B-BFAD-23E9F6854E03}" destId="{8691A1EA-C06B-1940-B23D-C813EA0B7820}" srcOrd="0" destOrd="0" parTransId="{119FCD34-7BB9-2447-B1F5-0D1FF11C25BD}" sibTransId="{425BD558-262A-3342-A338-6DBADA07F810}"/>
+    <dgm:cxn modelId="{B932AF85-FD07-874F-B7C3-370A53D17CF7}" srcId="{2E9AB500-9EEA-B24B-BFAD-23E9F6854E03}" destId="{7EB55D70-8522-7044-853D-5A8E4F0F68CA}" srcOrd="1" destOrd="0" parTransId="{45A00588-6C47-B848-9EE1-3CE1CDDCBF71}" sibTransId="{9B735F61-5D47-C34B-BB3D-7ED166BE1D76}"/>
+    <dgm:cxn modelId="{F26573B4-36D6-EA40-9C79-44CF6DA66408}" srcId="{9F94ACA7-3FE1-8B4F-B062-1A887DE17B02}" destId="{35879848-7C56-7B45-B696-578D096A64E5}" srcOrd="1" destOrd="0" parTransId="{C8974726-B287-0C49-A2D1-1AA537C2A060}" sibTransId="{E998CC53-F192-7B45-85E6-558F31821BC3}"/>
+    <dgm:cxn modelId="{F544087D-2A87-3A40-8A27-A03B10FC465F}" srcId="{9F94ACA7-3FE1-8B4F-B062-1A887DE17B02}" destId="{2E9AB500-9EEA-B24B-BFAD-23E9F6854E03}" srcOrd="0" destOrd="0" parTransId="{AC2AEC58-39E6-4C41-92E5-5F6D086015C2}" sibTransId="{EDD90332-3E3F-F44C-A743-E29905717FF9}"/>
+    <dgm:cxn modelId="{735EDEE2-650A-D944-A8A7-CEF92BE1C629}" type="presOf" srcId="{8691A1EA-C06B-1940-B23D-C813EA0B7820}" destId="{E80CB531-0A0A-C644-B3C6-F976F4908BAF}" srcOrd="0" destOrd="0" presId="urn:microsoft.com/office/officeart/2005/8/layout/lProcess2"/>
+    <dgm:cxn modelId="{212D5080-1722-3B40-9E3E-6315FBEC3659}" type="presOf" srcId="{70780454-15F8-6C4A-8BE4-3F4846B33989}" destId="{E1081024-1B77-FA42-8D71-A0993FA4C3BE}" srcOrd="0" destOrd="0" presId="urn:microsoft.com/office/officeart/2005/8/layout/lProcess2"/>
+    <dgm:cxn modelId="{2426F3D3-A570-4F47-89AF-0BA708E11C76}" type="presOf" srcId="{35879848-7C56-7B45-B696-578D096A64E5}" destId="{7CEBFC04-FE3E-7A40-B322-27A11792D2AE}" srcOrd="0" destOrd="0" presId="urn:microsoft.com/office/officeart/2005/8/layout/lProcess2"/>
+    <dgm:cxn modelId="{31EA412B-AAEA-A841-8BB8-E314F3962A2D}" srcId="{35879848-7C56-7B45-B696-578D096A64E5}" destId="{E59406EE-94DA-BE4C-97E2-AFF954C4C6B7}" srcOrd="0" destOrd="0" parTransId="{5DFF3423-46B5-1241-97B3-7C7EBB5861B7}" sibTransId="{8BDE8A60-7880-904B-9A88-9993E9F91AA2}"/>
+    <dgm:cxn modelId="{347F7CE7-2839-F045-928A-0440673B74B3}" type="presOf" srcId="{2E9AB500-9EEA-B24B-BFAD-23E9F6854E03}" destId="{294B8C95-6F0B-9E48-A6B1-3166AD8D1E52}" srcOrd="0" destOrd="0" presId="urn:microsoft.com/office/officeart/2005/8/layout/lProcess2"/>
     <dgm:cxn modelId="{71A0B20A-C55B-9D46-942B-5203A5C1455B}" type="presOf" srcId="{E59406EE-94DA-BE4C-97E2-AFF954C4C6B7}" destId="{1BD95893-6681-0742-BC7A-AADA1A98B6CB}" srcOrd="0" destOrd="0" presId="urn:microsoft.com/office/officeart/2005/8/layout/lProcess2"/>
     <dgm:cxn modelId="{262F0853-4CC5-BB44-BC4B-0E4EC875F308}" type="presOf" srcId="{9F94ACA7-3FE1-8B4F-B062-1A887DE17B02}" destId="{39439EAF-DDA2-E343-B08C-538387AF7A52}" srcOrd="0" destOrd="0" presId="urn:microsoft.com/office/officeart/2005/8/layout/lProcess2"/>
-    <dgm:cxn modelId="{B932AF85-FD07-874F-B7C3-370A53D17CF7}" srcId="{2E9AB500-9EEA-B24B-BFAD-23E9F6854E03}" destId="{7EB55D70-8522-7044-853D-5A8E4F0F68CA}" srcOrd="1" destOrd="0" parTransId="{45A00588-6C47-B848-9EE1-3CE1CDDCBF71}" sibTransId="{9B735F61-5D47-C34B-BB3D-7ED166BE1D76}"/>
-    <dgm:cxn modelId="{212D5080-1722-3B40-9E3E-6315FBEC3659}" type="presOf" srcId="{70780454-15F8-6C4A-8BE4-3F4846B33989}" destId="{E1081024-1B77-FA42-8D71-A0993FA4C3BE}" srcOrd="0" destOrd="0" presId="urn:microsoft.com/office/officeart/2005/8/layout/lProcess2"/>
-    <dgm:cxn modelId="{F26573B4-36D6-EA40-9C79-44CF6DA66408}" srcId="{9F94ACA7-3FE1-8B4F-B062-1A887DE17B02}" destId="{35879848-7C56-7B45-B696-578D096A64E5}" srcOrd="1" destOrd="0" parTransId="{C8974726-B287-0C49-A2D1-1AA537C2A060}" sibTransId="{E998CC53-F192-7B45-85E6-558F31821BC3}"/>
-    <dgm:cxn modelId="{2426F3D3-A570-4F47-89AF-0BA708E11C76}" type="presOf" srcId="{35879848-7C56-7B45-B696-578D096A64E5}" destId="{7CEBFC04-FE3E-7A40-B322-27A11792D2AE}" srcOrd="0" destOrd="0" presId="urn:microsoft.com/office/officeart/2005/8/layout/lProcess2"/>
-    <dgm:cxn modelId="{347F7CE7-2839-F045-928A-0440673B74B3}" type="presOf" srcId="{2E9AB500-9EEA-B24B-BFAD-23E9F6854E03}" destId="{294B8C95-6F0B-9E48-A6B1-3166AD8D1E52}" srcOrd="0" destOrd="0" presId="urn:microsoft.com/office/officeart/2005/8/layout/lProcess2"/>
     <dgm:cxn modelId="{9DBE2155-5CD9-CE4B-B67A-AF8E254F5E61}" type="presOf" srcId="{7EB55D70-8522-7044-853D-5A8E4F0F68CA}" destId="{ACFB5CF5-BE4B-9F4C-A830-A336B6BBFFEF}" srcOrd="0" destOrd="0" presId="urn:microsoft.com/office/officeart/2005/8/layout/lProcess2"/>
-    <dgm:cxn modelId="{735EDEE2-650A-D944-A8A7-CEF92BE1C629}" type="presOf" srcId="{8691A1EA-C06B-1940-B23D-C813EA0B7820}" destId="{E80CB531-0A0A-C644-B3C6-F976F4908BAF}" srcOrd="0" destOrd="0" presId="urn:microsoft.com/office/officeart/2005/8/layout/lProcess2"/>
-    <dgm:cxn modelId="{F544087D-2A87-3A40-8A27-A03B10FC465F}" srcId="{9F94ACA7-3FE1-8B4F-B062-1A887DE17B02}" destId="{2E9AB500-9EEA-B24B-BFAD-23E9F6854E03}" srcOrd="0" destOrd="0" parTransId="{AC2AEC58-39E6-4C41-92E5-5F6D086015C2}" sibTransId="{EDD90332-3E3F-F44C-A743-E29905717FF9}"/>
     <dgm:cxn modelId="{C0948357-80A2-EA40-BF43-FC919C33F31A}" type="presOf" srcId="{2E9AB500-9EEA-B24B-BFAD-23E9F6854E03}" destId="{99120308-EBF5-2244-BC84-08EF8369A5DE}" srcOrd="1" destOrd="0" presId="urn:microsoft.com/office/officeart/2005/8/layout/lProcess2"/>
     <dgm:cxn modelId="{39C7C8BC-E8B0-EA42-A75B-9B002C3F7D77}" type="presOf" srcId="{35879848-7C56-7B45-B696-578D096A64E5}" destId="{64C70908-601D-C94D-8310-E27E40AB0A4B}" srcOrd="1" destOrd="0" presId="urn:microsoft.com/office/officeart/2005/8/layout/lProcess2"/>
-    <dgm:cxn modelId="{E2C5E512-5507-D844-8420-B386D677ACDD}" srcId="{35879848-7C56-7B45-B696-578D096A64E5}" destId="{70780454-15F8-6C4A-8BE4-3F4846B33989}" srcOrd="1" destOrd="0" parTransId="{ADC686A8-A33B-1D45-AF57-EF5889F1803F}" sibTransId="{3C958075-157F-FE40-AACC-4CDAD7400F7A}"/>
-    <dgm:cxn modelId="{31EA412B-AAEA-A841-8BB8-E314F3962A2D}" srcId="{35879848-7C56-7B45-B696-578D096A64E5}" destId="{E59406EE-94DA-BE4C-97E2-AFF954C4C6B7}" srcOrd="0" destOrd="0" parTransId="{5DFF3423-46B5-1241-97B3-7C7EBB5861B7}" sibTransId="{8BDE8A60-7880-904B-9A88-9993E9F91AA2}"/>
-    <dgm:cxn modelId="{29570A30-B24A-104A-90FC-871E1B1AE76D}" srcId="{2E9AB500-9EEA-B24B-BFAD-23E9F6854E03}" destId="{8691A1EA-C06B-1940-B23D-C813EA0B7820}" srcOrd="0" destOrd="0" parTransId="{119FCD34-7BB9-2447-B1F5-0D1FF11C25BD}" sibTransId="{425BD558-262A-3342-A338-6DBADA07F810}"/>
     <dgm:cxn modelId="{9B7A4289-EDA9-5342-90BC-51D94CFDD1E2}" type="presParOf" srcId="{39439EAF-DDA2-E343-B08C-538387AF7A52}" destId="{BC9485F2-D34C-D14D-A138-5FCDE21F80E9}" srcOrd="0" destOrd="0" presId="urn:microsoft.com/office/officeart/2005/8/layout/lProcess2"/>
     <dgm:cxn modelId="{377F08E3-9C7C-9448-A5AE-412CA49CD70E}" type="presParOf" srcId="{BC9485F2-D34C-D14D-A138-5FCDE21F80E9}" destId="{294B8C95-6F0B-9E48-A6B1-3166AD8D1E52}" srcOrd="0" destOrd="0" presId="urn:microsoft.com/office/officeart/2005/8/layout/lProcess2"/>
     <dgm:cxn modelId="{D1A30444-0D53-874F-A32A-6DD4852D5E64}" type="presParOf" srcId="{BC9485F2-D34C-D14D-A138-5FCDE21F80E9}" destId="{99120308-EBF5-2244-BC84-08EF8369A5DE}" srcOrd="1" destOrd="0" presId="urn:microsoft.com/office/officeart/2005/8/layout/lProcess2"/>
@@ -3184,7 +3212,7 @@
           <a:p>
             <a:fld id="{35FE7589-C59F-FF46-8FBF-FAF974C06CCE}" type="datetimeFigureOut">
               <a:rPr lang="en-US" smtClean="0"/>
-              <a:t>2/12/13</a:t>
+              <a:t>2/16/14</a:t>
             </a:fld>
             <a:endParaRPr lang="en-US"/>
           </a:p>
@@ -3643,7 +3671,7 @@
           <a:p>
             <a:fld id="{A669C0BA-EDF4-C14E-BDB7-78028276B04E}" type="datetimeFigureOut">
               <a:rPr lang="en-US" smtClean="0"/>
-              <a:t>2/12/13</a:t>
+              <a:t>2/16/14</a:t>
             </a:fld>
             <a:endParaRPr lang="en-US"/>
           </a:p>
@@ -3827,7 +3855,7 @@
           <a:p>
             <a:fld id="{A669C0BA-EDF4-C14E-BDB7-78028276B04E}" type="datetimeFigureOut">
               <a:rPr lang="en-US" smtClean="0"/>
-              <a:t>2/12/13</a:t>
+              <a:t>2/16/14</a:t>
             </a:fld>
             <a:endParaRPr lang="en-US"/>
           </a:p>
@@ -4021,7 +4049,7 @@
           <a:p>
             <a:fld id="{A669C0BA-EDF4-C14E-BDB7-78028276B04E}" type="datetimeFigureOut">
               <a:rPr lang="en-US" smtClean="0"/>
-              <a:t>2/12/13</a:t>
+              <a:t>2/16/14</a:t>
             </a:fld>
             <a:endParaRPr lang="en-US"/>
           </a:p>
@@ -4205,7 +4233,7 @@
           <a:p>
             <a:fld id="{A669C0BA-EDF4-C14E-BDB7-78028276B04E}" type="datetimeFigureOut">
               <a:rPr lang="en-US" smtClean="0"/>
-              <a:t>2/12/13</a:t>
+              <a:t>2/16/14</a:t>
             </a:fld>
             <a:endParaRPr lang="en-US"/>
           </a:p>
@@ -4459,7 +4487,7 @@
           <a:p>
             <a:fld id="{A669C0BA-EDF4-C14E-BDB7-78028276B04E}" type="datetimeFigureOut">
               <a:rPr lang="en-US" smtClean="0"/>
-              <a:t>2/12/13</a:t>
+              <a:t>2/16/14</a:t>
             </a:fld>
             <a:endParaRPr lang="en-US"/>
           </a:p>
@@ -4761,7 +4789,7 @@
           <a:p>
             <a:fld id="{A669C0BA-EDF4-C14E-BDB7-78028276B04E}" type="datetimeFigureOut">
               <a:rPr lang="en-US" smtClean="0"/>
-              <a:t>2/12/13</a:t>
+              <a:t>2/16/14</a:t>
             </a:fld>
             <a:endParaRPr lang="en-US"/>
           </a:p>
@@ -5224,7 +5252,7 @@
           <a:p>
             <a:fld id="{A669C0BA-EDF4-C14E-BDB7-78028276B04E}" type="datetimeFigureOut">
               <a:rPr lang="en-US" smtClean="0"/>
-              <a:t>2/12/13</a:t>
+              <a:t>2/16/14</a:t>
             </a:fld>
             <a:endParaRPr lang="en-US"/>
           </a:p>
@@ -5383,7 +5411,7 @@
           <a:p>
             <a:fld id="{A669C0BA-EDF4-C14E-BDB7-78028276B04E}" type="datetimeFigureOut">
               <a:rPr lang="en-US" smtClean="0"/>
-              <a:t>2/12/13</a:t>
+              <a:t>2/16/14</a:t>
             </a:fld>
             <a:endParaRPr lang="en-US"/>
           </a:p>
@@ -5478,7 +5506,7 @@
           <a:p>
             <a:fld id="{A669C0BA-EDF4-C14E-BDB7-78028276B04E}" type="datetimeFigureOut">
               <a:rPr lang="en-US" smtClean="0"/>
-              <a:t>2/12/13</a:t>
+              <a:t>2/16/14</a:t>
             </a:fld>
             <a:endParaRPr lang="en-US"/>
           </a:p>
@@ -5773,7 +5801,7 @@
           <a:p>
             <a:fld id="{A669C0BA-EDF4-C14E-BDB7-78028276B04E}" type="datetimeFigureOut">
               <a:rPr lang="en-US" smtClean="0"/>
-              <a:t>2/12/13</a:t>
+              <a:t>2/16/14</a:t>
             </a:fld>
             <a:endParaRPr lang="en-US"/>
           </a:p>
@@ -6040,7 +6068,7 @@
           <a:p>
             <a:fld id="{A669C0BA-EDF4-C14E-BDB7-78028276B04E}" type="datetimeFigureOut">
               <a:rPr lang="en-US" smtClean="0"/>
-              <a:t>2/12/13</a:t>
+              <a:t>2/16/14</a:t>
             </a:fld>
             <a:endParaRPr lang="en-US"/>
           </a:p>
@@ -6253,7 +6281,7 @@
           <a:p>
             <a:fld id="{A669C0BA-EDF4-C14E-BDB7-78028276B04E}" type="datetimeFigureOut">
               <a:rPr lang="en-US" smtClean="0"/>
-              <a:t>2/12/13</a:t>
+              <a:t>2/16/14</a:t>
             </a:fld>
             <a:endParaRPr lang="en-US"/>
           </a:p>
@@ -8034,7 +8062,7 @@
       </p:sp>
       <p:pic>
         <p:nvPicPr>
-          <p:cNvPr id="5" name="Picture 4" descr="Screen Shot 2013-02-12 at 9.13.12 PM.png"/>
+          <p:cNvPr id="5" name="Picture 4" descr="Screen Shot 2014-02-16 at 10.50.31 PM.png"/>
           <p:cNvPicPr>
             <a:picLocks noChangeAspect="1"/>
           </p:cNvPicPr>
@@ -8054,8 +8082,8 @@
         </p:blipFill>
         <p:spPr>
           <a:xfrm>
-            <a:off x="0" y="2215955"/>
-            <a:ext cx="9144000" cy="3072637"/>
+            <a:off x="0" y="2127502"/>
+            <a:ext cx="9144000" cy="2887081"/>
           </a:xfrm>
           <a:prstGeom prst="rect">
             <a:avLst/>
@@ -8560,7 +8588,7 @@
       </p:sp>
       <p:pic>
         <p:nvPicPr>
-          <p:cNvPr id="4" name="Picture 3" descr="Screen Shot 2013-02-12 at 9.13.12 PM.png"/>
+          <p:cNvPr id="4" name="Picture 3" descr="Screen Shot 2014-02-16 at 10.50.31 PM.png"/>
           <p:cNvPicPr>
             <a:picLocks noChangeAspect="1"/>
           </p:cNvPicPr>
@@ -8580,8 +8608,8 @@
         </p:blipFill>
         <p:spPr>
           <a:xfrm>
-            <a:off x="0" y="2815545"/>
-            <a:ext cx="9144000" cy="3072637"/>
+            <a:off x="0" y="2727917"/>
+            <a:ext cx="9144000" cy="2887081"/>
           </a:xfrm>
           <a:prstGeom prst="rect">
             <a:avLst/>

</xml_diff>